<commit_message>
Added somethings to the last slide
</commit_message>
<xml_diff>
--- a/Group-3_PowerPoint.pptx
+++ b/Group-3_PowerPoint.pptx
@@ -197,7 +197,7 @@
           <a:p>
             <a:fld id="{1EBEDD12-BCD5-485B-BCBC-34BB01D7923C}" type="datetimeFigureOut">
               <a:rPr lang="en-US" smtClean="0"/>
-              <a:t>1/27/2025</a:t>
+              <a:t>1/28/2025</a:t>
             </a:fld>
             <a:endParaRPr lang="en-US" dirty="0"/>
           </a:p>
@@ -411,7 +411,7 @@
           <a:p>
             <a:fld id="{6EE7A52F-9D89-7442-A8E9-48D1527B5F6B}" type="datetimeFigureOut">
               <a:rPr lang="en-US" smtClean="0"/>
-              <a:t>1/27/2025</a:t>
+              <a:t>1/28/2025</a:t>
             </a:fld>
             <a:endParaRPr lang="en-US" dirty="0"/>
           </a:p>
@@ -10555,12 +10555,12 @@
         <p:spPr/>
         <p:txBody>
           <a:bodyPr>
-            <a:normAutofit fontScale="85000" lnSpcReduction="20000"/>
+            <a:noAutofit/>
           </a:bodyPr>
           <a:lstStyle/>
           <a:p>
             <a:r>
-              <a:rPr lang="en-US" dirty="0">
+              <a:rPr lang="en-US" sz="1050" dirty="0">
                 <a:solidFill>
                   <a:schemeClr val="bg1"/>
                 </a:solidFill>
@@ -10572,7 +10572,7 @@
           <a:p>
             <a:pPr lvl="1"/>
             <a:r>
-              <a:rPr lang="en-US" dirty="0">
+              <a:rPr lang="en-US" sz="1050" dirty="0">
                 <a:solidFill>
                   <a:schemeClr val="bg1"/>
                 </a:solidFill>
@@ -10584,7 +10584,7 @@
           <a:p>
             <a:pPr lvl="1"/>
             <a:r>
-              <a:rPr lang="en-US" dirty="0">
+              <a:rPr lang="en-US" sz="1050" dirty="0">
                 <a:solidFill>
                   <a:schemeClr val="bg1"/>
                 </a:solidFill>
@@ -10595,7 +10595,7 @@
           </a:p>
           <a:p>
             <a:r>
-              <a:rPr lang="en-US" dirty="0">
+              <a:rPr lang="en-US" sz="1050" dirty="0">
                 <a:solidFill>
                   <a:schemeClr val="bg1"/>
                 </a:solidFill>
@@ -10607,7 +10607,7 @@
           <a:p>
             <a:pPr lvl="1"/>
             <a:r>
-              <a:rPr lang="en-US" dirty="0">
+              <a:rPr lang="en-US" sz="1050" dirty="0">
                 <a:solidFill>
                   <a:schemeClr val="bg1"/>
                 </a:solidFill>
@@ -10619,7 +10619,7 @@
           <a:p>
             <a:pPr lvl="1"/>
             <a:r>
-              <a:rPr lang="en-US" dirty="0">
+              <a:rPr lang="en-US" sz="1050" dirty="0">
                 <a:solidFill>
                   <a:schemeClr val="bg1"/>
                 </a:solidFill>
@@ -10630,7 +10630,81 @@
           </a:p>
           <a:p>
             <a:r>
-              <a:rPr lang="en-US" dirty="0">
+              <a:rPr lang="en-US" sz="1050" dirty="0">
+                <a:solidFill>
+                  <a:schemeClr val="bg1"/>
+                </a:solidFill>
+                <a:latin typeface="Abadi" panose="020B0604020104020204" pitchFamily="34" charset="0"/>
+              </a:rPr>
+              <a:t>Data Ethics:</a:t>
+            </a:r>
+          </a:p>
+          <a:p>
+            <a:pPr lvl="1"/>
+            <a:r>
+              <a:rPr lang="en-US" sz="1050" b="1" dirty="0">
+                <a:solidFill>
+                  <a:schemeClr val="bg1"/>
+                </a:solidFill>
+                <a:latin typeface="Abadi" panose="020B0604020104020204" pitchFamily="34" charset="0"/>
+              </a:rPr>
+              <a:t>Transparency: </a:t>
+            </a:r>
+            <a:r>
+              <a:rPr lang="en-US" sz="1050" b="0" dirty="0">
+                <a:solidFill>
+                  <a:schemeClr val="bg1"/>
+                </a:solidFill>
+                <a:latin typeface="Abadi" panose="020B0604020104020204" pitchFamily="34" charset="0"/>
+              </a:rPr>
+              <a:t>Ensure openness about data sources, methodology, and limitations to maintain public trust.</a:t>
+            </a:r>
+          </a:p>
+          <a:p>
+            <a:pPr lvl="1"/>
+            <a:r>
+              <a:rPr lang="en-US" sz="1050" b="1" dirty="0">
+                <a:solidFill>
+                  <a:schemeClr val="bg1"/>
+                </a:solidFill>
+                <a:latin typeface="Abadi" panose="020B0604020104020204" pitchFamily="34" charset="0"/>
+              </a:rPr>
+              <a:t>Privacy: </a:t>
+            </a:r>
+            <a:r>
+              <a:rPr lang="en-US" sz="1050" b="0" dirty="0">
+                <a:solidFill>
+                  <a:schemeClr val="bg1"/>
+                </a:solidFill>
+                <a:latin typeface="Abadi" panose="020B0604020104020204" pitchFamily="34" charset="0"/>
+              </a:rPr>
+              <a:t>Protect individual survey responses and demographic data to safeguard participant anonymity.</a:t>
+            </a:r>
+          </a:p>
+          <a:p>
+            <a:pPr lvl="1"/>
+            <a:r>
+              <a:rPr lang="en-US" sz="1050" b="1" dirty="0">
+                <a:solidFill>
+                  <a:schemeClr val="bg1"/>
+                </a:solidFill>
+                <a:latin typeface="Abadi" panose="020B0604020104020204" pitchFamily="34" charset="0"/>
+              </a:rPr>
+              <a:t>Bias Mitigation: </a:t>
+            </a:r>
+            <a:r>
+              <a:rPr lang="en-US" sz="1050" b="0" dirty="0">
+                <a:solidFill>
+                  <a:schemeClr val="bg1"/>
+                </a:solidFill>
+                <a:latin typeface="Abadi" panose="020B0604020104020204" pitchFamily="34" charset="0"/>
+              </a:rPr>
+              <a:t>Continuously review and address potential biases in data collection, processing, and analysis.</a:t>
+            </a:r>
+          </a:p>
+          <a:p>
+            <a:r>
+              <a:rPr lang="en-US" sz="1050" dirty="0">
                 <a:solidFill>
                   <a:schemeClr val="bg1"/>
                 </a:solidFill>
@@ -10642,7 +10716,7 @@
           <a:p>
             <a:pPr lvl="1"/>
             <a:r>
-              <a:rPr lang="en-US" dirty="0">
+              <a:rPr lang="en-US" sz="1050" dirty="0">
                 <a:solidFill>
                   <a:schemeClr val="bg1"/>
                 </a:solidFill>
@@ -10654,7 +10728,7 @@
           <a:p>
             <a:pPr lvl="1"/>
             <a:r>
-              <a:rPr lang="en-US" dirty="0">
+              <a:rPr lang="en-US" sz="1050" dirty="0">
                 <a:solidFill>
                   <a:schemeClr val="bg1"/>
                 </a:solidFill>
@@ -11562,15 +11636,6 @@
 </file>
 
 <file path=customXml/item1.xml><?xml version="1.0" encoding="utf-8"?>
-<?mso-contentType ?>
-<FormTemplates xmlns="http://schemas.microsoft.com/sharepoint/v3/contenttype/forms">
-  <Display>DocumentLibraryForm</Display>
-  <Edit>DocumentLibraryForm</Edit>
-  <New>DocumentLibraryForm</New>
-</FormTemplates>
-</file>
-
-<file path=customXml/item2.xml><?xml version="1.0" encoding="utf-8"?>
 <p:properties xmlns:p="http://schemas.microsoft.com/office/2006/metadata/properties" xmlns:xsi="http://www.w3.org/2001/XMLSchema-instance" xmlns:pc="http://schemas.microsoft.com/office/infopath/2007/PartnerControls">
   <documentManagement>
     <Background xmlns="71af3243-3dd4-4a8d-8c0d-dd76da1f02a5">false</Background>
@@ -11588,6 +11653,15 @@
     <MediaServiceKeyPoints xmlns="71af3243-3dd4-4a8d-8c0d-dd76da1f02a5" xsi:nil="true"/>
   </documentManagement>
 </p:properties>
+</file>
+
+<file path=customXml/item2.xml><?xml version="1.0" encoding="utf-8"?>
+<?mso-contentType ?>
+<FormTemplates xmlns="http://schemas.microsoft.com/sharepoint/v3/contenttype/forms">
+  <Display>DocumentLibraryForm</Display>
+  <Edit>DocumentLibraryForm</Edit>
+  <New>DocumentLibraryForm</New>
+</FormTemplates>
 </file>
 
 <file path=customXml/item3.xml><?xml version="1.0" encoding="utf-8"?>
@@ -11903,14 +11977,6 @@
 </file>
 
 <file path=customXml/itemProps1.xml><?xml version="1.0" encoding="utf-8"?>
-<ds:datastoreItem xmlns:ds="http://schemas.openxmlformats.org/officeDocument/2006/customXml" ds:itemID="{C21FFAC0-05A2-416A-B06C-C248395482CF}">
-  <ds:schemaRefs>
-    <ds:schemaRef ds:uri="http://schemas.microsoft.com/sharepoint/v3/contenttype/forms"/>
-  </ds:schemaRefs>
-</ds:datastoreItem>
-</file>
-
-<file path=customXml/itemProps2.xml><?xml version="1.0" encoding="utf-8"?>
 <ds:datastoreItem xmlns:ds="http://schemas.openxmlformats.org/officeDocument/2006/customXml" ds:itemID="{4F4B194E-8B30-4377-8C59-ECFB902D2A26}">
   <ds:schemaRefs>
     <ds:schemaRef ds:uri="http://schemas.microsoft.com/office/2006/metadata/properties"/>
@@ -11918,6 +11984,14 @@
     <ds:schemaRef ds:uri="71af3243-3dd4-4a8d-8c0d-dd76da1f02a5"/>
     <ds:schemaRef ds:uri="http://schemas.microsoft.com/sharepoint/v3"/>
     <ds:schemaRef ds:uri="230e9df3-be65-4c73-a93b-d1236ebd677e"/>
+  </ds:schemaRefs>
+</ds:datastoreItem>
+</file>
+
+<file path=customXml/itemProps2.xml><?xml version="1.0" encoding="utf-8"?>
+<ds:datastoreItem xmlns:ds="http://schemas.openxmlformats.org/officeDocument/2006/customXml" ds:itemID="{C21FFAC0-05A2-416A-B06C-C248395482CF}">
+  <ds:schemaRefs>
+    <ds:schemaRef ds:uri="http://schemas.microsoft.com/sharepoint/v3/contenttype/forms"/>
   </ds:schemaRefs>
 </ds:datastoreItem>
 </file>

</xml_diff>

<commit_message>
Updated the Graphs on PowerPoint
</commit_message>
<xml_diff>
--- a/Group-3_PowerPoint.pptx
+++ b/Group-3_PowerPoint.pptx
@@ -10023,22 +10023,70 @@
       </p:grpSpPr>
       <p:pic>
         <p:nvPicPr>
-          <p:cNvPr id="4" name="Picture 3" descr="1.png"/>
+          <p:cNvPr id="9" name="Picture 8" descr="A graph of blue and white lines&#10;&#10;Description automatically generated with medium confidence">
+            <a:extLst>
+              <a:ext uri="{FF2B5EF4-FFF2-40B4-BE49-F238E27FC236}">
+                <a16:creationId xmlns:a16="http://schemas.microsoft.com/office/drawing/2014/main" id="{D51ED76C-820B-8329-C8ED-62B8CD303F4C}"/>
+              </a:ext>
+            </a:extLst>
+          </p:cNvPr>
           <p:cNvPicPr>
             <a:picLocks noChangeAspect="1"/>
           </p:cNvPicPr>
           <p:nvPr/>
         </p:nvPicPr>
         <p:blipFill>
-          <a:blip r:embed="rId2"/>
+          <a:blip r:embed="rId2">
+            <a:extLst>
+              <a:ext uri="{28A0092B-C50C-407E-A947-70E740481C1C}">
+                <a14:useLocalDpi xmlns:a14="http://schemas.microsoft.com/office/drawing/2010/main" val="0"/>
+              </a:ext>
+            </a:extLst>
+          </a:blip>
           <a:stretch>
             <a:fillRect/>
           </a:stretch>
         </p:blipFill>
         <p:spPr>
           <a:xfrm>
-            <a:off x="6893156" y="1783079"/>
-            <a:ext cx="4809894" cy="2705565"/>
+            <a:off x="7823700" y="3378700"/>
+            <a:ext cx="3656138" cy="2895100"/>
+          </a:xfrm>
+          <a:prstGeom prst="rect">
+            <a:avLst/>
+          </a:prstGeom>
+        </p:spPr>
+      </p:pic>
+      <p:pic>
+        <p:nvPicPr>
+          <p:cNvPr id="7" name="Picture 6" descr="A graph of blue and white lines&#10;&#10;Description automatically generated with medium confidence">
+            <a:extLst>
+              <a:ext uri="{FF2B5EF4-FFF2-40B4-BE49-F238E27FC236}">
+                <a16:creationId xmlns:a16="http://schemas.microsoft.com/office/drawing/2014/main" id="{F1F879FC-7A6F-08E3-B718-E0874EAF6FEB}"/>
+              </a:ext>
+            </a:extLst>
+          </p:cNvPr>
+          <p:cNvPicPr>
+            <a:picLocks noChangeAspect="1"/>
+          </p:cNvPicPr>
+          <p:nvPr/>
+        </p:nvPicPr>
+        <p:blipFill>
+          <a:blip r:embed="rId3">
+            <a:extLst>
+              <a:ext uri="{28A0092B-C50C-407E-A947-70E740481C1C}">
+                <a14:useLocalDpi xmlns:a14="http://schemas.microsoft.com/office/drawing/2010/main" val="0"/>
+              </a:ext>
+            </a:extLst>
+          </a:blip>
+          <a:stretch>
+            <a:fillRect/>
+          </a:stretch>
+        </p:blipFill>
+        <p:spPr>
+          <a:xfrm>
+            <a:off x="7826606" y="406400"/>
+            <a:ext cx="3656138" cy="2851151"/>
           </a:xfrm>
           <a:prstGeom prst="rect">
             <a:avLst/>
@@ -11636,6 +11684,15 @@
 </file>
 
 <file path=customXml/item1.xml><?xml version="1.0" encoding="utf-8"?>
+<?mso-contentType ?>
+<FormTemplates xmlns="http://schemas.microsoft.com/sharepoint/v3/contenttype/forms">
+  <Display>DocumentLibraryForm</Display>
+  <Edit>DocumentLibraryForm</Edit>
+  <New>DocumentLibraryForm</New>
+</FormTemplates>
+</file>
+
+<file path=customXml/item2.xml><?xml version="1.0" encoding="utf-8"?>
 <p:properties xmlns:p="http://schemas.microsoft.com/office/2006/metadata/properties" xmlns:xsi="http://www.w3.org/2001/XMLSchema-instance" xmlns:pc="http://schemas.microsoft.com/office/infopath/2007/PartnerControls">
   <documentManagement>
     <Background xmlns="71af3243-3dd4-4a8d-8c0d-dd76da1f02a5">false</Background>
@@ -11653,15 +11710,6 @@
     <MediaServiceKeyPoints xmlns="71af3243-3dd4-4a8d-8c0d-dd76da1f02a5" xsi:nil="true"/>
   </documentManagement>
 </p:properties>
-</file>
-
-<file path=customXml/item2.xml><?xml version="1.0" encoding="utf-8"?>
-<?mso-contentType ?>
-<FormTemplates xmlns="http://schemas.microsoft.com/sharepoint/v3/contenttype/forms">
-  <Display>DocumentLibraryForm</Display>
-  <Edit>DocumentLibraryForm</Edit>
-  <New>DocumentLibraryForm</New>
-</FormTemplates>
 </file>
 
 <file path=customXml/item3.xml><?xml version="1.0" encoding="utf-8"?>
@@ -11977,6 +12025,14 @@
 </file>
 
 <file path=customXml/itemProps1.xml><?xml version="1.0" encoding="utf-8"?>
+<ds:datastoreItem xmlns:ds="http://schemas.openxmlformats.org/officeDocument/2006/customXml" ds:itemID="{C21FFAC0-05A2-416A-B06C-C248395482CF}">
+  <ds:schemaRefs>
+    <ds:schemaRef ds:uri="http://schemas.microsoft.com/sharepoint/v3/contenttype/forms"/>
+  </ds:schemaRefs>
+</ds:datastoreItem>
+</file>
+
+<file path=customXml/itemProps2.xml><?xml version="1.0" encoding="utf-8"?>
 <ds:datastoreItem xmlns:ds="http://schemas.openxmlformats.org/officeDocument/2006/customXml" ds:itemID="{4F4B194E-8B30-4377-8C59-ECFB902D2A26}">
   <ds:schemaRefs>
     <ds:schemaRef ds:uri="http://schemas.microsoft.com/office/2006/metadata/properties"/>
@@ -11984,14 +12040,6 @@
     <ds:schemaRef ds:uri="71af3243-3dd4-4a8d-8c0d-dd76da1f02a5"/>
     <ds:schemaRef ds:uri="http://schemas.microsoft.com/sharepoint/v3"/>
     <ds:schemaRef ds:uri="230e9df3-be65-4c73-a93b-d1236ebd677e"/>
-  </ds:schemaRefs>
-</ds:datastoreItem>
-</file>
-
-<file path=customXml/itemProps2.xml><?xml version="1.0" encoding="utf-8"?>
-<ds:datastoreItem xmlns:ds="http://schemas.openxmlformats.org/officeDocument/2006/customXml" ds:itemID="{C21FFAC0-05A2-416A-B06C-C248395482CF}">
-  <ds:schemaRefs>
-    <ds:schemaRef ds:uri="http://schemas.microsoft.com/sharepoint/v3/contenttype/forms"/>
   </ds:schemaRefs>
 </ds:datastoreItem>
 </file>

</xml_diff>